<commit_message>
one last slide in case
</commit_message>
<xml_diff>
--- a/TipoftheTongue.pptx
+++ b/TipoftheTongue.pptx
@@ -5,7 +5,7 @@
     <p:sldMasterId id="2147483660" r:id="rId1"/>
   </p:sldMasterIdLst>
   <p:notesMasterIdLst>
-    <p:notesMasterId r:id="rId9"/>
+    <p:notesMasterId r:id="rId10"/>
   </p:notesMasterIdLst>
   <p:sldIdLst>
     <p:sldId id="256" r:id="rId2"/>
@@ -15,6 +15,7 @@
     <p:sldId id="262" r:id="rId6"/>
     <p:sldId id="263" r:id="rId7"/>
     <p:sldId id="264" r:id="rId8"/>
+    <p:sldId id="265" r:id="rId9"/>
   </p:sldIdLst>
   <p:sldSz cx="9144000" cy="6858000" type="screen4x3"/>
   <p:notesSz cx="6858000" cy="9144000"/>
@@ -113,6 +114,14 @@
       </a:defRPr>
     </a:lvl9pPr>
   </p:defaultTextStyle>
+  <p:extLst>
+    <p:ext uri="{EFAFB233-063F-42B5-8137-9DF3F51BA10A}">
+      <p15:sldGuideLst xmlns:p15="http://schemas.microsoft.com/office/powerpoint/2012/main"/>
+    </p:ext>
+    <p:ext uri="{2D200454-40CA-4A62-9FC3-DE9A4176ACB9}">
+      <p15:notesGuideLst xmlns:p15="http://schemas.microsoft.com/office/powerpoint/2012/main"/>
+    </p:ext>
+  </p:extLst>
 </p:presentation>
 </file>
 
@@ -198,7 +207,7 @@
           <a:p>
             <a:fld id="{09FC0A89-AC64-4200-8AAA-DE54857B0D90}" type="datetimeFigureOut">
               <a:rPr lang="en-US" smtClean="0"/>
-              <a:t>6/17/2016</a:t>
+              <a:t>6/18/2016</a:t>
             </a:fld>
             <a:endParaRPr lang="en-US"/>
           </a:p>
@@ -1384,6 +1393,98 @@
 </p:notes>
 </file>
 
+<file path=ppt/notesSlides/notesSlide8.xml><?xml version="1.0" encoding="utf-8"?>
+<p:notes xmlns:a="http://schemas.openxmlformats.org/drawingml/2006/main" xmlns:r="http://schemas.openxmlformats.org/officeDocument/2006/relationships" xmlns:p="http://schemas.openxmlformats.org/presentationml/2006/main">
+  <p:cSld>
+    <p:spTree>
+      <p:nvGrpSpPr>
+        <p:cNvPr id="1" name=""/>
+        <p:cNvGrpSpPr/>
+        <p:nvPr/>
+      </p:nvGrpSpPr>
+      <p:grpSpPr>
+        <a:xfrm>
+          <a:off x="0" y="0"/>
+          <a:ext cx="0" cy="0"/>
+          <a:chOff x="0" y="0"/>
+          <a:chExt cx="0" cy="0"/>
+        </a:xfrm>
+      </p:grpSpPr>
+      <p:sp>
+        <p:nvSpPr>
+          <p:cNvPr id="2" name="Slide Image Placeholder 1"/>
+          <p:cNvSpPr>
+            <a:spLocks noGrp="1" noRot="1" noChangeAspect="1"/>
+          </p:cNvSpPr>
+          <p:nvPr>
+            <p:ph type="sldImg"/>
+          </p:nvPr>
+        </p:nvSpPr>
+        <p:spPr/>
+      </p:sp>
+      <p:sp>
+        <p:nvSpPr>
+          <p:cNvPr id="3" name="Notes Placeholder 2"/>
+          <p:cNvSpPr>
+            <a:spLocks noGrp="1"/>
+          </p:cNvSpPr>
+          <p:nvPr>
+            <p:ph type="body" idx="1"/>
+          </p:nvPr>
+        </p:nvSpPr>
+        <p:spPr/>
+        <p:txBody>
+          <a:bodyPr/>
+          <a:lstStyle/>
+          <a:p>
+            <a:r>
+              <a:rPr lang="en-US" dirty="0" smtClean="0"/>
+              <a:t>In case we do the demo and still </a:t>
+            </a:r>
+            <a:r>
+              <a:rPr lang="en-US" smtClean="0"/>
+              <a:t>have time to fill..</a:t>
+            </a:r>
+            <a:endParaRPr lang="en-US" dirty="0"/>
+          </a:p>
+        </p:txBody>
+      </p:sp>
+      <p:sp>
+        <p:nvSpPr>
+          <p:cNvPr id="4" name="Slide Number Placeholder 3"/>
+          <p:cNvSpPr>
+            <a:spLocks noGrp="1"/>
+          </p:cNvSpPr>
+          <p:nvPr>
+            <p:ph type="sldNum" sz="quarter" idx="10"/>
+          </p:nvPr>
+        </p:nvSpPr>
+        <p:spPr/>
+        <p:txBody>
+          <a:bodyPr/>
+          <a:lstStyle/>
+          <a:p>
+            <a:fld id="{61248C3B-CB3D-487A-A524-035C09FF5B94}" type="slidenum">
+              <a:rPr lang="en-US" smtClean="0"/>
+              <a:t>8</a:t>
+            </a:fld>
+            <a:endParaRPr lang="en-US"/>
+          </a:p>
+        </p:txBody>
+      </p:sp>
+    </p:spTree>
+    <p:extLst>
+      <p:ext uri="{BB962C8B-B14F-4D97-AF65-F5344CB8AC3E}">
+        <p14:creationId xmlns:p14="http://schemas.microsoft.com/office/powerpoint/2010/main" val="1532137032"/>
+      </p:ext>
+    </p:extLst>
+  </p:cSld>
+  <p:clrMapOvr>
+    <a:masterClrMapping/>
+  </p:clrMapOvr>
+</p:notes>
+</file>
+
 <file path=ppt/slideLayouts/slideLayout1.xml><?xml version="1.0" encoding="utf-8"?>
 <p:sldLayout xmlns:a="http://schemas.openxmlformats.org/drawingml/2006/main" xmlns:r="http://schemas.openxmlformats.org/officeDocument/2006/relationships" xmlns:p="http://schemas.openxmlformats.org/presentationml/2006/main" type="title" preserve="1">
   <p:cSld name="Title Slide">
@@ -1515,7 +1616,7 @@
           <a:p>
             <a:fld id="{C764DE79-268F-4C1A-8933-263129D2AF90}" type="datetimeFigureOut">
               <a:rPr lang="en-US" smtClean="0"/>
-              <a:t>6/17/2016</a:t>
+              <a:t>6/18/2016</a:t>
             </a:fld>
             <a:endParaRPr lang="en-US" dirty="0"/>
           </a:p>
@@ -1685,7 +1786,7 @@
           <a:p>
             <a:fld id="{C764DE79-268F-4C1A-8933-263129D2AF90}" type="datetimeFigureOut">
               <a:rPr lang="en-US" smtClean="0"/>
-              <a:t>6/17/2016</a:t>
+              <a:t>6/18/2016</a:t>
             </a:fld>
             <a:endParaRPr lang="en-US" dirty="0"/>
           </a:p>
@@ -1865,7 +1966,7 @@
           <a:p>
             <a:fld id="{C764DE79-268F-4C1A-8933-263129D2AF90}" type="datetimeFigureOut">
               <a:rPr lang="en-US" smtClean="0"/>
-              <a:t>6/17/2016</a:t>
+              <a:t>6/18/2016</a:t>
             </a:fld>
             <a:endParaRPr lang="en-US" dirty="0"/>
           </a:p>
@@ -2035,7 +2136,7 @@
           <a:p>
             <a:fld id="{C764DE79-268F-4C1A-8933-263129D2AF90}" type="datetimeFigureOut">
               <a:rPr lang="en-US" smtClean="0"/>
-              <a:t>6/17/2016</a:t>
+              <a:t>6/18/2016</a:t>
             </a:fld>
             <a:endParaRPr lang="en-US" dirty="0"/>
           </a:p>
@@ -2279,7 +2380,7 @@
           <a:p>
             <a:fld id="{C764DE79-268F-4C1A-8933-263129D2AF90}" type="datetimeFigureOut">
               <a:rPr lang="en-US" smtClean="0"/>
-              <a:t>6/17/2016</a:t>
+              <a:t>6/18/2016</a:t>
             </a:fld>
             <a:endParaRPr lang="en-US" dirty="0"/>
           </a:p>
@@ -2511,7 +2612,7 @@
           <a:p>
             <a:fld id="{C764DE79-268F-4C1A-8933-263129D2AF90}" type="datetimeFigureOut">
               <a:rPr lang="en-US" smtClean="0"/>
-              <a:t>6/17/2016</a:t>
+              <a:t>6/18/2016</a:t>
             </a:fld>
             <a:endParaRPr lang="en-US" dirty="0"/>
           </a:p>
@@ -2878,7 +2979,7 @@
           <a:p>
             <a:fld id="{C764DE79-268F-4C1A-8933-263129D2AF90}" type="datetimeFigureOut">
               <a:rPr lang="en-US" smtClean="0"/>
-              <a:t>6/17/2016</a:t>
+              <a:t>6/18/2016</a:t>
             </a:fld>
             <a:endParaRPr lang="en-US" dirty="0"/>
           </a:p>
@@ -2996,7 +3097,7 @@
           <a:p>
             <a:fld id="{C764DE79-268F-4C1A-8933-263129D2AF90}" type="datetimeFigureOut">
               <a:rPr lang="en-US" smtClean="0"/>
-              <a:t>6/17/2016</a:t>
+              <a:t>6/18/2016</a:t>
             </a:fld>
             <a:endParaRPr lang="en-US" dirty="0"/>
           </a:p>
@@ -3091,7 +3192,7 @@
           <a:p>
             <a:fld id="{C764DE79-268F-4C1A-8933-263129D2AF90}" type="datetimeFigureOut">
               <a:rPr lang="en-US" smtClean="0"/>
-              <a:t>6/17/2016</a:t>
+              <a:t>6/18/2016</a:t>
             </a:fld>
             <a:endParaRPr lang="en-US" dirty="0"/>
           </a:p>
@@ -3368,7 +3469,7 @@
           <a:p>
             <a:fld id="{C764DE79-268F-4C1A-8933-263129D2AF90}" type="datetimeFigureOut">
               <a:rPr lang="en-US" smtClean="0"/>
-              <a:t>6/17/2016</a:t>
+              <a:t>6/18/2016</a:t>
             </a:fld>
             <a:endParaRPr lang="en-US" dirty="0"/>
           </a:p>
@@ -3625,7 +3726,7 @@
           <a:p>
             <a:fld id="{C764DE79-268F-4C1A-8933-263129D2AF90}" type="datetimeFigureOut">
               <a:rPr lang="en-US" smtClean="0"/>
-              <a:t>6/17/2016</a:t>
+              <a:t>6/18/2016</a:t>
             </a:fld>
             <a:endParaRPr lang="en-US" dirty="0"/>
           </a:p>
@@ -3838,7 +3939,7 @@
           <a:p>
             <a:fld id="{C764DE79-268F-4C1A-8933-263129D2AF90}" type="datetimeFigureOut">
               <a:rPr lang="en-US" smtClean="0"/>
-              <a:t>6/17/2016</a:t>
+              <a:t>6/18/2016</a:t>
             </a:fld>
             <a:endParaRPr lang="en-US" dirty="0"/>
           </a:p>
@@ -4389,11 +4490,6 @@
               </a:rPr>
               <a:t>When you can't quite remember the song in your head</a:t>
             </a:r>
-            <a:endParaRPr lang="en-US" dirty="0">
-              <a:solidFill>
-                <a:srgbClr val="F720A8"/>
-              </a:solidFill>
-            </a:endParaRPr>
           </a:p>
         </p:txBody>
       </p:sp>
@@ -5323,6 +5419,180 @@
     <p:extLst>
       <p:ext uri="{BB962C8B-B14F-4D97-AF65-F5344CB8AC3E}">
         <p14:creationId xmlns:p14="http://schemas.microsoft.com/office/powerpoint/2010/main" val="1790830918"/>
+      </p:ext>
+    </p:extLst>
+  </p:cSld>
+  <p:clrMapOvr>
+    <a:masterClrMapping/>
+  </p:clrMapOvr>
+</p:sld>
+</file>
+
+<file path=ppt/slides/slide8.xml><?xml version="1.0" encoding="utf-8"?>
+<p:sld xmlns:a="http://schemas.openxmlformats.org/drawingml/2006/main" xmlns:r="http://schemas.openxmlformats.org/officeDocument/2006/relationships" xmlns:p="http://schemas.openxmlformats.org/presentationml/2006/main">
+  <p:cSld>
+    <p:spTree>
+      <p:nvGrpSpPr>
+        <p:cNvPr id="1" name=""/>
+        <p:cNvGrpSpPr/>
+        <p:nvPr/>
+      </p:nvGrpSpPr>
+      <p:grpSpPr>
+        <a:xfrm>
+          <a:off x="0" y="0"/>
+          <a:ext cx="0" cy="0"/>
+          <a:chOff x="0" y="0"/>
+          <a:chExt cx="0" cy="0"/>
+        </a:xfrm>
+      </p:grpSpPr>
+      <p:pic>
+        <p:nvPicPr>
+          <p:cNvPr id="4" name="Picture 3"/>
+          <p:cNvPicPr>
+            <a:picLocks noChangeAspect="1"/>
+          </p:cNvPicPr>
+          <p:nvPr/>
+        </p:nvPicPr>
+        <p:blipFill>
+          <a:blip r:embed="rId3">
+            <a:extLst>
+              <a:ext uri="{28A0092B-C50C-407E-A947-70E740481C1C}">
+                <a14:useLocalDpi xmlns:a14="http://schemas.microsoft.com/office/drawing/2010/main" val="0"/>
+              </a:ext>
+            </a:extLst>
+          </a:blip>
+          <a:stretch>
+            <a:fillRect/>
+          </a:stretch>
+        </p:blipFill>
+        <p:spPr>
+          <a:xfrm>
+            <a:off x="0" y="0"/>
+            <a:ext cx="9143999" cy="6858000"/>
+          </a:xfrm>
+          <a:prstGeom prst="rect">
+            <a:avLst/>
+          </a:prstGeom>
+        </p:spPr>
+      </p:pic>
+      <p:sp>
+        <p:nvSpPr>
+          <p:cNvPr id="2" name="Title 1"/>
+          <p:cNvSpPr>
+            <a:spLocks noGrp="1"/>
+          </p:cNvSpPr>
+          <p:nvPr>
+            <p:ph type="title"/>
+          </p:nvPr>
+        </p:nvSpPr>
+        <p:spPr>
+          <a:xfrm>
+            <a:off x="0" y="1131094"/>
+            <a:ext cx="9144000" cy="994172"/>
+          </a:xfrm>
+          <a:solidFill>
+            <a:srgbClr val="585858"/>
+          </a:solidFill>
+        </p:spPr>
+        <p:txBody>
+          <a:bodyPr/>
+          <a:lstStyle/>
+          <a:p>
+            <a:pPr algn="ctr"/>
+            <a:r>
+              <a:rPr lang="en-US" b="1" dirty="0" smtClean="0">
+                <a:solidFill>
+                  <a:srgbClr val="F720A8"/>
+                </a:solidFill>
+              </a:rPr>
+              <a:t>Tip of the Tongue – The </a:t>
+            </a:r>
+            <a:r>
+              <a:rPr lang="en-US" b="1" dirty="0" smtClean="0">
+                <a:solidFill>
+                  <a:srgbClr val="F720A8"/>
+                </a:solidFill>
+              </a:rPr>
+              <a:t>Future</a:t>
+            </a:r>
+            <a:endParaRPr lang="en-US" b="1" dirty="0">
+              <a:solidFill>
+                <a:srgbClr val="F720A8"/>
+              </a:solidFill>
+            </a:endParaRPr>
+          </a:p>
+        </p:txBody>
+      </p:sp>
+      <p:sp>
+        <p:nvSpPr>
+          <p:cNvPr id="3" name="Content Placeholder 2"/>
+          <p:cNvSpPr>
+            <a:spLocks noGrp="1"/>
+          </p:cNvSpPr>
+          <p:nvPr>
+            <p:ph idx="1"/>
+          </p:nvPr>
+        </p:nvSpPr>
+        <p:spPr>
+          <a:xfrm>
+            <a:off x="628650" y="2848281"/>
+            <a:ext cx="7886700" cy="2981019"/>
+          </a:xfrm>
+        </p:spPr>
+        <p:txBody>
+          <a:bodyPr>
+            <a:normAutofit/>
+          </a:bodyPr>
+          <a:lstStyle/>
+          <a:p>
+            <a:r>
+              <a:rPr lang="en-US" dirty="0"/>
+              <a:t>What </a:t>
+            </a:r>
+            <a:r>
+              <a:rPr lang="en-US" dirty="0" smtClean="0"/>
+              <a:t>else could we do</a:t>
+            </a:r>
+            <a:r>
+              <a:rPr lang="en-US" dirty="0" smtClean="0"/>
+              <a:t>?</a:t>
+            </a:r>
+            <a:endParaRPr lang="en-US" dirty="0"/>
+          </a:p>
+          <a:p>
+            <a:pPr lvl="1"/>
+            <a:r>
+              <a:rPr lang="en-US" dirty="0" smtClean="0"/>
+              <a:t>Access multiple music lyrics sources for a more complete return.</a:t>
+            </a:r>
+            <a:endParaRPr lang="en-US" dirty="0"/>
+          </a:p>
+          <a:p>
+            <a:pPr lvl="1"/>
+            <a:r>
+              <a:rPr lang="en-US" dirty="0" smtClean="0"/>
+              <a:t>Store other user data like preferences, history.</a:t>
+            </a:r>
+            <a:endParaRPr lang="en-US" dirty="0" smtClean="0"/>
+          </a:p>
+          <a:p>
+            <a:pPr lvl="1"/>
+            <a:r>
+              <a:rPr lang="en-US" dirty="0"/>
+              <a:t>Make recommendations to user based on their previous </a:t>
+            </a:r>
+            <a:r>
+              <a:rPr lang="en-US" dirty="0" smtClean="0"/>
+              <a:t>choices.</a:t>
+            </a:r>
+            <a:endParaRPr lang="en-US" dirty="0" smtClean="0"/>
+          </a:p>
+        </p:txBody>
+      </p:sp>
+    </p:spTree>
+    <p:extLst>
+      <p:ext uri="{BB962C8B-B14F-4D97-AF65-F5344CB8AC3E}">
+        <p14:creationId xmlns:p14="http://schemas.microsoft.com/office/powerpoint/2010/main" val="3877566390"/>
       </p:ext>
     </p:extLst>
   </p:cSld>

</xml_diff>

<commit_message>
added in new user stuff, updated screen shots
</commit_message>
<xml_diff>
--- a/TipoftheTongue.pptx
+++ b/TipoftheTongue.pptx
@@ -4611,7 +4611,7 @@
         </p:spPr>
         <p:txBody>
           <a:bodyPr>
-            <a:normAutofit lnSpcReduction="10000"/>
+            <a:normAutofit fontScale="92500" lnSpcReduction="10000"/>
           </a:bodyPr>
           <a:lstStyle/>
           <a:p>
@@ -4655,7 +4655,15 @@
             <a:pPr lvl="1"/>
             <a:r>
               <a:rPr lang="en-US" dirty="0" smtClean="0"/>
-              <a:t>front end, design, back end coding, project management</a:t>
+              <a:t>front end, design, back end coding, </a:t>
+            </a:r>
+            <a:r>
+              <a:rPr lang="en-US" dirty="0" smtClean="0"/>
+              <a:t>code integration, project </a:t>
+            </a:r>
+            <a:r>
+              <a:rPr lang="en-US" dirty="0" smtClean="0"/>
+              <a:t>management</a:t>
             </a:r>
             <a:endParaRPr lang="en-US" dirty="0"/>
           </a:p>
@@ -4834,7 +4842,18 @@
             <a:pPr lvl="1"/>
             <a:r>
               <a:rPr lang="en-US" dirty="0" smtClean="0"/>
-              <a:t>And be able to find other track information about the artist(s)</a:t>
+              <a:t>And be able to find other track information about the artist(s</a:t>
+            </a:r>
+            <a:r>
+              <a:rPr lang="en-US" dirty="0" smtClean="0"/>
+              <a:t>)</a:t>
+            </a:r>
+          </a:p>
+          <a:p>
+            <a:pPr lvl="1"/>
+            <a:r>
+              <a:rPr lang="en-US" dirty="0" smtClean="0"/>
+              <a:t>And remember a few things about the user.</a:t>
             </a:r>
             <a:endParaRPr lang="en-US" dirty="0"/>
           </a:p>
@@ -5069,7 +5088,7 @@
       </p:grpSpPr>
       <p:pic>
         <p:nvPicPr>
-          <p:cNvPr id="10" name="Picture 9"/>
+          <p:cNvPr id="4" name="Picture 3"/>
           <p:cNvPicPr>
             <a:picLocks noChangeAspect="1"/>
           </p:cNvPicPr>
@@ -5089,8 +5108,8 @@
         </p:blipFill>
         <p:spPr>
           <a:xfrm>
-            <a:off x="5431285" y="449339"/>
-            <a:ext cx="2667000" cy="3562350"/>
+            <a:off x="5448160" y="306645"/>
+            <a:ext cx="2828925" cy="3781425"/>
           </a:xfrm>
           <a:prstGeom prst="rect">
             <a:avLst/>
@@ -5099,7 +5118,7 @@
       </p:pic>
       <p:pic>
         <p:nvPicPr>
-          <p:cNvPr id="9" name="Picture 8"/>
+          <p:cNvPr id="3" name="Picture 2"/>
           <p:cNvPicPr>
             <a:picLocks noChangeAspect="1"/>
           </p:cNvPicPr>
@@ -5119,8 +5138,8 @@
         </p:blipFill>
         <p:spPr>
           <a:xfrm>
-            <a:off x="435745" y="1597010"/>
-            <a:ext cx="5724525" cy="4095750"/>
+            <a:off x="292869" y="1673210"/>
+            <a:ext cx="6010275" cy="3943350"/>
           </a:xfrm>
           <a:prstGeom prst="rect">
             <a:avLst/>
@@ -5129,7 +5148,7 @@
       </p:pic>
       <p:pic>
         <p:nvPicPr>
-          <p:cNvPr id="11" name="Picture 10"/>
+          <p:cNvPr id="5" name="Picture 4"/>
           <p:cNvPicPr>
             <a:picLocks noChangeAspect="1"/>
           </p:cNvPicPr>
@@ -5149,8 +5168,8 @@
         </p:blipFill>
         <p:spPr>
           <a:xfrm>
-            <a:off x="6862623" y="3792244"/>
-            <a:ext cx="1562100" cy="2800350"/>
+            <a:off x="7140640" y="3644885"/>
+            <a:ext cx="1562100" cy="2790825"/>
           </a:xfrm>
           <a:prstGeom prst="rect">
             <a:avLst/>
@@ -5505,15 +5524,7 @@
                   <a:srgbClr val="F720A8"/>
                 </a:solidFill>
               </a:rPr>
-              <a:t>Tip of the Tongue – The </a:t>
-            </a:r>
-            <a:r>
-              <a:rPr lang="en-US" b="1" dirty="0" smtClean="0">
-                <a:solidFill>
-                  <a:srgbClr val="F720A8"/>
-                </a:solidFill>
-              </a:rPr>
-              <a:t>Future</a:t>
+              <a:t>Tip of the Tongue – The Future</a:t>
             </a:r>
             <a:endParaRPr lang="en-US" b="1" dirty="0">
               <a:solidFill>
@@ -5551,11 +5562,7 @@
             </a:r>
             <a:r>
               <a:rPr lang="en-US" dirty="0" smtClean="0"/>
-              <a:t>else could we do</a:t>
-            </a:r>
-            <a:r>
-              <a:rPr lang="en-US" dirty="0" smtClean="0"/>
-              <a:t>?</a:t>
+              <a:t>else could we do?</a:t>
             </a:r>
             <a:endParaRPr lang="en-US" dirty="0"/>
           </a:p>
@@ -5571,7 +5578,11 @@
             <a:pPr lvl="1"/>
             <a:r>
               <a:rPr lang="en-US" dirty="0" smtClean="0"/>
-              <a:t>Store other user data like preferences, history.</a:t>
+              <a:t>Store other user data like preferences, </a:t>
+            </a:r>
+            <a:r>
+              <a:rPr lang="en-US" dirty="0" smtClean="0"/>
+              <a:t>playlists.</a:t>
             </a:r>
             <a:endParaRPr lang="en-US" dirty="0" smtClean="0"/>
           </a:p>
@@ -5583,7 +5594,18 @@
             </a:r>
             <a:r>
               <a:rPr lang="en-US" dirty="0" smtClean="0"/>
-              <a:t>choices.</a:t>
+              <a:t>choices</a:t>
+            </a:r>
+            <a:r>
+              <a:rPr lang="en-US" dirty="0" smtClean="0"/>
+              <a:t>.</a:t>
+            </a:r>
+          </a:p>
+          <a:p>
+            <a:pPr lvl="1"/>
+            <a:r>
+              <a:rPr lang="en-US" dirty="0" smtClean="0"/>
+              <a:t>Design a platform for sharing playlists, likes.</a:t>
             </a:r>
             <a:endParaRPr lang="en-US" dirty="0" smtClean="0"/>
           </a:p>

</xml_diff>